<commit_message>
Correção nos cosmeticos e Eggwaver
- Diagramas foram atualizados
- Correção nos comentários do Eggwaver
</commit_message>
<xml_diff>
--- a/Cosmetico/DiagramasBanner.pptx
+++ b/Cosmetico/DiagramasBanner.pptx
@@ -8,6 +8,7 @@
     <p:sldId id="256" r:id="rId2"/>
     <p:sldId id="257" r:id="rId3"/>
     <p:sldId id="258" r:id="rId4"/>
+    <p:sldId id="259" r:id="rId5"/>
   </p:sldIdLst>
   <p:sldSz cx="12192000" cy="6858000"/>
   <p:notesSz cx="6858000" cy="9144000"/>
@@ -263,7 +264,7 @@
           <a:p>
             <a:fld id="{B6567CAC-3A0B-4D4A-AAB2-5A51AE666B9E}" type="datetimeFigureOut">
               <a:rPr lang="en-US" smtClean="0"/>
-              <a:t>10/27/2020</a:t>
+              <a:t>11/14/2020</a:t>
             </a:fld>
             <a:endParaRPr lang="en-US"/>
           </a:p>
@@ -463,7 +464,7 @@
           <a:p>
             <a:fld id="{B6567CAC-3A0B-4D4A-AAB2-5A51AE666B9E}" type="datetimeFigureOut">
               <a:rPr lang="en-US" smtClean="0"/>
-              <a:t>10/27/2020</a:t>
+              <a:t>11/14/2020</a:t>
             </a:fld>
             <a:endParaRPr lang="en-US"/>
           </a:p>
@@ -673,7 +674,7 @@
           <a:p>
             <a:fld id="{B6567CAC-3A0B-4D4A-AAB2-5A51AE666B9E}" type="datetimeFigureOut">
               <a:rPr lang="en-US" smtClean="0"/>
-              <a:t>10/27/2020</a:t>
+              <a:t>11/14/2020</a:t>
             </a:fld>
             <a:endParaRPr lang="en-US"/>
           </a:p>
@@ -873,7 +874,7 @@
           <a:p>
             <a:fld id="{B6567CAC-3A0B-4D4A-AAB2-5A51AE666B9E}" type="datetimeFigureOut">
               <a:rPr lang="en-US" smtClean="0"/>
-              <a:t>10/27/2020</a:t>
+              <a:t>11/14/2020</a:t>
             </a:fld>
             <a:endParaRPr lang="en-US"/>
           </a:p>
@@ -1149,7 +1150,7 @@
           <a:p>
             <a:fld id="{B6567CAC-3A0B-4D4A-AAB2-5A51AE666B9E}" type="datetimeFigureOut">
               <a:rPr lang="en-US" smtClean="0"/>
-              <a:t>10/27/2020</a:t>
+              <a:t>11/14/2020</a:t>
             </a:fld>
             <a:endParaRPr lang="en-US"/>
           </a:p>
@@ -1417,7 +1418,7 @@
           <a:p>
             <a:fld id="{B6567CAC-3A0B-4D4A-AAB2-5A51AE666B9E}" type="datetimeFigureOut">
               <a:rPr lang="en-US" smtClean="0"/>
-              <a:t>10/27/2020</a:t>
+              <a:t>11/14/2020</a:t>
             </a:fld>
             <a:endParaRPr lang="en-US"/>
           </a:p>
@@ -1832,7 +1833,7 @@
           <a:p>
             <a:fld id="{B6567CAC-3A0B-4D4A-AAB2-5A51AE666B9E}" type="datetimeFigureOut">
               <a:rPr lang="en-US" smtClean="0"/>
-              <a:t>10/27/2020</a:t>
+              <a:t>11/14/2020</a:t>
             </a:fld>
             <a:endParaRPr lang="en-US"/>
           </a:p>
@@ -1974,7 +1975,7 @@
           <a:p>
             <a:fld id="{B6567CAC-3A0B-4D4A-AAB2-5A51AE666B9E}" type="datetimeFigureOut">
               <a:rPr lang="en-US" smtClean="0"/>
-              <a:t>10/27/2020</a:t>
+              <a:t>11/14/2020</a:t>
             </a:fld>
             <a:endParaRPr lang="en-US"/>
           </a:p>
@@ -2087,7 +2088,7 @@
           <a:p>
             <a:fld id="{B6567CAC-3A0B-4D4A-AAB2-5A51AE666B9E}" type="datetimeFigureOut">
               <a:rPr lang="en-US" smtClean="0"/>
-              <a:t>10/27/2020</a:t>
+              <a:t>11/14/2020</a:t>
             </a:fld>
             <a:endParaRPr lang="en-US"/>
           </a:p>
@@ -2400,7 +2401,7 @@
           <a:p>
             <a:fld id="{B6567CAC-3A0B-4D4A-AAB2-5A51AE666B9E}" type="datetimeFigureOut">
               <a:rPr lang="en-US" smtClean="0"/>
-              <a:t>10/27/2020</a:t>
+              <a:t>11/14/2020</a:t>
             </a:fld>
             <a:endParaRPr lang="en-US"/>
           </a:p>
@@ -2689,7 +2690,7 @@
           <a:p>
             <a:fld id="{B6567CAC-3A0B-4D4A-AAB2-5A51AE666B9E}" type="datetimeFigureOut">
               <a:rPr lang="en-US" smtClean="0"/>
-              <a:t>10/27/2020</a:t>
+              <a:t>11/14/2020</a:t>
             </a:fld>
             <a:endParaRPr lang="en-US"/>
           </a:p>
@@ -2932,7 +2933,7 @@
           <a:p>
             <a:fld id="{B6567CAC-3A0B-4D4A-AAB2-5A51AE666B9E}" type="datetimeFigureOut">
               <a:rPr lang="en-US" smtClean="0"/>
-              <a:t>10/27/2020</a:t>
+              <a:t>11/14/2020</a:t>
             </a:fld>
             <a:endParaRPr lang="en-US"/>
           </a:p>
@@ -4015,7 +4016,7 @@
                   <a:latin typeface="Arial" panose="020B0604020202020204" pitchFamily="34" charset="0"/>
                   <a:cs typeface="Arial" panose="020B0604020202020204" pitchFamily="34" charset="0"/>
                 </a:rPr>
-                <a:t>8 vezes</a:t>
+                <a:t>9 vezes</a:t>
               </a:r>
             </a:p>
             <a:p>
@@ -4482,10 +4483,10 @@
       </p:grpSpPr>
       <p:grpSp>
         <p:nvGrpSpPr>
-          <p:cNvPr id="18" name="Agrupar 17">
+          <p:cNvPr id="2" name="Agrupar 1">
             <a:extLst>
               <a:ext uri="{FF2B5EF4-FFF2-40B4-BE49-F238E27FC236}">
-                <a16:creationId xmlns:a16="http://schemas.microsoft.com/office/drawing/2014/main" id="{E5B0F714-1129-4EBA-9E85-48C1662F1D5B}"/>
+                <a16:creationId xmlns:a16="http://schemas.microsoft.com/office/drawing/2014/main" id="{E57BF736-CB4D-4C7A-BC06-A0230A1FE2E0}"/>
               </a:ext>
             </a:extLst>
           </p:cNvPr>
@@ -4495,9 +4496,9 @@
         <p:grpSpPr>
           <a:xfrm>
             <a:off x="1890944" y="1136815"/>
-            <a:ext cx="8194090" cy="4686937"/>
+            <a:ext cx="7892248" cy="4686937"/>
             <a:chOff x="1890944" y="1136815"/>
-            <a:chExt cx="8194090" cy="4686937"/>
+            <a:chExt cx="7892248" cy="4686937"/>
           </a:xfrm>
         </p:grpSpPr>
         <p:sp>
@@ -4515,7 +4516,7 @@
           <p:spPr>
             <a:xfrm>
               <a:off x="1890944" y="1159249"/>
-              <a:ext cx="8194090" cy="4664503"/>
+              <a:ext cx="7892248" cy="4664503"/>
             </a:xfrm>
             <a:prstGeom prst="roundRect">
               <a:avLst>
@@ -4880,56 +4881,6 @@
             </a:fontRef>
           </p:style>
         </p:cxnSp>
-        <p:sp>
-          <p:nvSpPr>
-            <p:cNvPr id="33" name="CaixaDeTexto 32">
-              <a:extLst>
-                <a:ext uri="{FF2B5EF4-FFF2-40B4-BE49-F238E27FC236}">
-                  <a16:creationId xmlns:a16="http://schemas.microsoft.com/office/drawing/2014/main" id="{4E582E58-4457-4AB9-90CE-A7388E1A64CC}"/>
-                </a:ext>
-              </a:extLst>
-            </p:cNvPr>
-            <p:cNvSpPr txBox="1"/>
-            <p:nvPr/>
-          </p:nvSpPr>
-          <p:spPr>
-            <a:xfrm>
-              <a:off x="8316896" y="3231673"/>
-              <a:ext cx="1505540" cy="646331"/>
-            </a:xfrm>
-            <a:prstGeom prst="rect">
-              <a:avLst/>
-            </a:prstGeom>
-            <a:noFill/>
-          </p:spPr>
-          <p:txBody>
-            <a:bodyPr wrap="none" rtlCol="0">
-              <a:spAutoFit/>
-            </a:bodyPr>
-            <a:lstStyle/>
-            <a:p>
-              <a:r>
-                <a:rPr lang="pt-BR" dirty="0">
-                  <a:solidFill>
-                    <a:schemeClr val="bg1"/>
-                  </a:solidFill>
-                  <a:latin typeface="Arial" panose="020B0604020202020204" pitchFamily="34" charset="0"/>
-                  <a:cs typeface="Arial" panose="020B0604020202020204" pitchFamily="34" charset="0"/>
-                </a:rPr>
-                <a:t>20 segundos</a:t>
-              </a:r>
-            </a:p>
-            <a:p>
-              <a:endParaRPr lang="en-US" dirty="0">
-                <a:solidFill>
-                  <a:schemeClr val="bg1"/>
-                </a:solidFill>
-                <a:latin typeface="Arial" panose="020B0604020202020204" pitchFamily="34" charset="0"/>
-                <a:cs typeface="Arial" panose="020B0604020202020204" pitchFamily="34" charset="0"/>
-              </a:endParaRPr>
-            </a:p>
-          </p:txBody>
-        </p:sp>
         <p:sp>
           <p:nvSpPr>
             <p:cNvPr id="40" name="CaixaDeTexto 39">
@@ -6420,8 +6371,8 @@
           </p:nvSpPr>
           <p:spPr>
             <a:xfrm>
-              <a:off x="2436984" y="3227897"/>
-              <a:ext cx="1505540" cy="646331"/>
+              <a:off x="2759288" y="3093173"/>
+              <a:ext cx="1315029" cy="646331"/>
             </a:xfrm>
             <a:prstGeom prst="rect">
               <a:avLst/>
@@ -6429,11 +6380,12 @@
             <a:noFill/>
           </p:spPr>
           <p:txBody>
-            <a:bodyPr wrap="none" rtlCol="0">
+            <a:bodyPr wrap="square" rtlCol="0">
               <a:spAutoFit/>
             </a:bodyPr>
             <a:lstStyle/>
             <a:p>
+              <a:pPr algn="ctr"/>
               <a:r>
                 <a:rPr lang="pt-BR" dirty="0">
                   <a:solidFill>
@@ -6442,17 +6394,76 @@
                   <a:latin typeface="Arial" panose="020B0604020202020204" pitchFamily="34" charset="0"/>
                   <a:cs typeface="Arial" panose="020B0604020202020204" pitchFamily="34" charset="0"/>
                 </a:rPr>
-                <a:t>20 segundos</a:t>
+                <a:t>15 </a:t>
               </a:r>
             </a:p>
             <a:p>
-              <a:endParaRPr lang="en-US" dirty="0">
-                <a:solidFill>
-                  <a:schemeClr val="bg1"/>
-                </a:solidFill>
-                <a:latin typeface="Arial" panose="020B0604020202020204" pitchFamily="34" charset="0"/>
-                <a:cs typeface="Arial" panose="020B0604020202020204" pitchFamily="34" charset="0"/>
-              </a:endParaRPr>
+              <a:pPr algn="ctr"/>
+              <a:r>
+                <a:rPr lang="pt-BR" dirty="0">
+                  <a:solidFill>
+                    <a:schemeClr val="bg1"/>
+                  </a:solidFill>
+                  <a:latin typeface="Arial" panose="020B0604020202020204" pitchFamily="34" charset="0"/>
+                  <a:cs typeface="Arial" panose="020B0604020202020204" pitchFamily="34" charset="0"/>
+                </a:rPr>
+                <a:t>segundos</a:t>
+              </a:r>
+            </a:p>
+          </p:txBody>
+        </p:sp>
+        <p:sp>
+          <p:nvSpPr>
+            <p:cNvPr id="47" name="CaixaDeTexto 46">
+              <a:extLst>
+                <a:ext uri="{FF2B5EF4-FFF2-40B4-BE49-F238E27FC236}">
+                  <a16:creationId xmlns:a16="http://schemas.microsoft.com/office/drawing/2014/main" id="{B70482E9-9B54-4F3B-8BE8-949B580D4310}"/>
+                </a:ext>
+              </a:extLst>
+            </p:cNvPr>
+            <p:cNvSpPr txBox="1"/>
+            <p:nvPr/>
+          </p:nvSpPr>
+          <p:spPr>
+            <a:xfrm>
+              <a:off x="8378245" y="3041199"/>
+              <a:ext cx="1315029" cy="646331"/>
+            </a:xfrm>
+            <a:prstGeom prst="rect">
+              <a:avLst/>
+            </a:prstGeom>
+            <a:noFill/>
+          </p:spPr>
+          <p:txBody>
+            <a:bodyPr wrap="square" rtlCol="0">
+              <a:spAutoFit/>
+            </a:bodyPr>
+            <a:lstStyle/>
+            <a:p>
+              <a:pPr algn="ctr"/>
+              <a:r>
+                <a:rPr lang="pt-BR" dirty="0">
+                  <a:solidFill>
+                    <a:schemeClr val="bg1"/>
+                  </a:solidFill>
+                  <a:latin typeface="Arial" panose="020B0604020202020204" pitchFamily="34" charset="0"/>
+                  <a:cs typeface="Arial" panose="020B0604020202020204" pitchFamily="34" charset="0"/>
+                </a:rPr>
+                <a:t>15 </a:t>
+              </a:r>
+            </a:p>
+            <a:p>
+              <a:pPr algn="ctr"/>
+              <a:r>
+                <a:rPr lang="pt-BR" dirty="0">
+                  <a:solidFill>
+                    <a:schemeClr val="bg1"/>
+                  </a:solidFill>
+                  <a:latin typeface="Arial" panose="020B0604020202020204" pitchFamily="34" charset="0"/>
+                  <a:cs typeface="Arial" panose="020B0604020202020204" pitchFamily="34" charset="0"/>
+                </a:rPr>
+                <a:t>segundos</a:t>
+              </a:r>
             </a:p>
           </p:txBody>
         </p:sp>
@@ -7106,6 +7117,1669 @@
     <p:extLst>
       <p:ext uri="{BB962C8B-B14F-4D97-AF65-F5344CB8AC3E}">
         <p14:creationId xmlns:p14="http://schemas.microsoft.com/office/powerpoint/2010/main" val="513898306"/>
+      </p:ext>
+    </p:extLst>
+  </p:cSld>
+  <p:clrMapOvr>
+    <a:masterClrMapping/>
+  </p:clrMapOvr>
+</p:sld>
+</file>
+
+<file path=ppt/slides/slide4.xml><?xml version="1.0" encoding="utf-8"?>
+<p:sld xmlns:a="http://schemas.openxmlformats.org/drawingml/2006/main" xmlns:r="http://schemas.openxmlformats.org/officeDocument/2006/relationships" xmlns:p="http://schemas.openxmlformats.org/presentationml/2006/main">
+  <p:cSld>
+    <p:bg>
+      <p:bgPr>
+        <a:solidFill>
+          <a:srgbClr val="121212"/>
+        </a:solidFill>
+        <a:effectLst/>
+      </p:bgPr>
+    </p:bg>
+    <p:spTree>
+      <p:nvGrpSpPr>
+        <p:cNvPr id="1" name=""/>
+        <p:cNvGrpSpPr/>
+        <p:nvPr/>
+      </p:nvGrpSpPr>
+      <p:grpSpPr>
+        <a:xfrm>
+          <a:off x="0" y="0"/>
+          <a:ext cx="0" cy="0"/>
+          <a:chOff x="0" y="0"/>
+          <a:chExt cx="0" cy="0"/>
+        </a:xfrm>
+      </p:grpSpPr>
+      <p:pic>
+        <p:nvPicPr>
+          <p:cNvPr id="24" name="Imagem 23">
+            <a:extLst>
+              <a:ext uri="{FF2B5EF4-FFF2-40B4-BE49-F238E27FC236}">
+                <a16:creationId xmlns:a16="http://schemas.microsoft.com/office/drawing/2014/main" id="{AA3B2966-024D-4D0E-B600-C75C4481D4CC}"/>
+              </a:ext>
+            </a:extLst>
+          </p:cNvPr>
+          <p:cNvPicPr>
+            <a:picLocks noChangeAspect="1"/>
+          </p:cNvPicPr>
+          <p:nvPr/>
+        </p:nvPicPr>
+        <p:blipFill>
+          <a:blip r:embed="rId2"/>
+          <a:stretch>
+            <a:fillRect/>
+          </a:stretch>
+        </p:blipFill>
+        <p:spPr>
+          <a:xfrm>
+            <a:off x="7397750" y="737966"/>
+            <a:ext cx="2772162" cy="3172268"/>
+          </a:xfrm>
+          <a:prstGeom prst="rect">
+            <a:avLst/>
+          </a:prstGeom>
+        </p:spPr>
+      </p:pic>
+      <p:pic>
+        <p:nvPicPr>
+          <p:cNvPr id="32" name="Imagem 31">
+            <a:extLst>
+              <a:ext uri="{FF2B5EF4-FFF2-40B4-BE49-F238E27FC236}">
+                <a16:creationId xmlns:a16="http://schemas.microsoft.com/office/drawing/2014/main" id="{AED88140-D170-4A9F-8D79-C08AC1AB629F}"/>
+              </a:ext>
+            </a:extLst>
+          </p:cNvPr>
+          <p:cNvPicPr>
+            <a:picLocks noChangeAspect="1"/>
+          </p:cNvPicPr>
+          <p:nvPr/>
+        </p:nvPicPr>
+        <p:blipFill>
+          <a:blip r:embed="rId3"/>
+          <a:stretch>
+            <a:fillRect/>
+          </a:stretch>
+        </p:blipFill>
+        <p:spPr>
+          <a:xfrm>
+            <a:off x="7716775" y="4136992"/>
+            <a:ext cx="885949" cy="476316"/>
+          </a:xfrm>
+          <a:prstGeom prst="rect">
+            <a:avLst/>
+          </a:prstGeom>
+        </p:spPr>
+      </p:pic>
+      <p:grpSp>
+        <p:nvGrpSpPr>
+          <p:cNvPr id="54" name="Agrupar 53">
+            <a:extLst>
+              <a:ext uri="{FF2B5EF4-FFF2-40B4-BE49-F238E27FC236}">
+                <a16:creationId xmlns:a16="http://schemas.microsoft.com/office/drawing/2014/main" id="{73887C3B-3B62-40D7-AD26-39268C03BC8D}"/>
+              </a:ext>
+            </a:extLst>
+          </p:cNvPr>
+          <p:cNvGrpSpPr/>
+          <p:nvPr/>
+        </p:nvGrpSpPr>
+        <p:grpSpPr>
+          <a:xfrm>
+            <a:off x="815975" y="1438275"/>
+            <a:ext cx="5905500" cy="2294582"/>
+            <a:chOff x="815975" y="1438275"/>
+            <a:chExt cx="5905500" cy="2294582"/>
+          </a:xfrm>
+        </p:grpSpPr>
+        <p:sp>
+          <p:nvSpPr>
+            <p:cNvPr id="2" name="Elipse 1">
+              <a:extLst>
+                <a:ext uri="{FF2B5EF4-FFF2-40B4-BE49-F238E27FC236}">
+                  <a16:creationId xmlns:a16="http://schemas.microsoft.com/office/drawing/2014/main" id="{B62C416A-6327-4711-9371-931AD22BA1C3}"/>
+                </a:ext>
+              </a:extLst>
+            </p:cNvPr>
+            <p:cNvSpPr/>
+            <p:nvPr/>
+          </p:nvSpPr>
+          <p:spPr>
+            <a:xfrm>
+              <a:off x="958850" y="1511300"/>
+              <a:ext cx="647700" cy="647700"/>
+            </a:xfrm>
+            <a:prstGeom prst="ellipse">
+              <a:avLst/>
+            </a:prstGeom>
+            <a:solidFill>
+              <a:srgbClr val="A7CF2D"/>
+            </a:solidFill>
+            <a:ln>
+              <a:noFill/>
+            </a:ln>
+          </p:spPr>
+          <p:style>
+            <a:lnRef idx="2">
+              <a:schemeClr val="accent1">
+                <a:shade val="50000"/>
+              </a:schemeClr>
+            </a:lnRef>
+            <a:fillRef idx="1">
+              <a:schemeClr val="accent1"/>
+            </a:fillRef>
+            <a:effectRef idx="0">
+              <a:schemeClr val="accent1"/>
+            </a:effectRef>
+            <a:fontRef idx="minor">
+              <a:schemeClr val="lt1"/>
+            </a:fontRef>
+          </p:style>
+          <p:txBody>
+            <a:bodyPr rtlCol="0" anchor="ctr"/>
+            <a:lstStyle/>
+            <a:p>
+              <a:pPr algn="ctr"/>
+              <a:endParaRPr lang="en-US"/>
+            </a:p>
+          </p:txBody>
+        </p:sp>
+        <p:sp>
+          <p:nvSpPr>
+            <p:cNvPr id="3" name="Elipse 2">
+              <a:extLst>
+                <a:ext uri="{FF2B5EF4-FFF2-40B4-BE49-F238E27FC236}">
+                  <a16:creationId xmlns:a16="http://schemas.microsoft.com/office/drawing/2014/main" id="{DD64E041-D55A-41F2-A0C9-A51C67000E1F}"/>
+                </a:ext>
+              </a:extLst>
+            </p:cNvPr>
+            <p:cNvSpPr/>
+            <p:nvPr/>
+          </p:nvSpPr>
+          <p:spPr>
+            <a:xfrm>
+              <a:off x="1936750" y="1511300"/>
+              <a:ext cx="647700" cy="647700"/>
+            </a:xfrm>
+            <a:prstGeom prst="ellipse">
+              <a:avLst/>
+            </a:prstGeom>
+            <a:solidFill>
+              <a:srgbClr val="A7CF2D"/>
+            </a:solidFill>
+            <a:ln>
+              <a:noFill/>
+            </a:ln>
+          </p:spPr>
+          <p:style>
+            <a:lnRef idx="2">
+              <a:schemeClr val="accent1">
+                <a:shade val="50000"/>
+              </a:schemeClr>
+            </a:lnRef>
+            <a:fillRef idx="1">
+              <a:schemeClr val="accent1"/>
+            </a:fillRef>
+            <a:effectRef idx="0">
+              <a:schemeClr val="accent1"/>
+            </a:effectRef>
+            <a:fontRef idx="minor">
+              <a:schemeClr val="lt1"/>
+            </a:fontRef>
+          </p:style>
+          <p:txBody>
+            <a:bodyPr rtlCol="0" anchor="ctr"/>
+            <a:lstStyle/>
+            <a:p>
+              <a:pPr algn="ctr"/>
+              <a:endParaRPr lang="en-US"/>
+            </a:p>
+          </p:txBody>
+        </p:sp>
+        <p:sp>
+          <p:nvSpPr>
+            <p:cNvPr id="4" name="Elipse 3">
+              <a:extLst>
+                <a:ext uri="{FF2B5EF4-FFF2-40B4-BE49-F238E27FC236}">
+                  <a16:creationId xmlns:a16="http://schemas.microsoft.com/office/drawing/2014/main" id="{B0E407CD-26CD-48AE-9BBA-71323CB51055}"/>
+                </a:ext>
+              </a:extLst>
+            </p:cNvPr>
+            <p:cNvSpPr/>
+            <p:nvPr/>
+          </p:nvSpPr>
+          <p:spPr>
+            <a:xfrm>
+              <a:off x="2914650" y="1511300"/>
+              <a:ext cx="647700" cy="647700"/>
+            </a:xfrm>
+            <a:prstGeom prst="ellipse">
+              <a:avLst/>
+            </a:prstGeom>
+            <a:solidFill>
+              <a:srgbClr val="B61700"/>
+            </a:solidFill>
+            <a:ln>
+              <a:noFill/>
+            </a:ln>
+          </p:spPr>
+          <p:style>
+            <a:lnRef idx="2">
+              <a:schemeClr val="accent1">
+                <a:shade val="50000"/>
+              </a:schemeClr>
+            </a:lnRef>
+            <a:fillRef idx="1">
+              <a:schemeClr val="accent1"/>
+            </a:fillRef>
+            <a:effectRef idx="0">
+              <a:schemeClr val="accent1"/>
+            </a:effectRef>
+            <a:fontRef idx="minor">
+              <a:schemeClr val="lt1"/>
+            </a:fontRef>
+          </p:style>
+          <p:txBody>
+            <a:bodyPr rtlCol="0" anchor="ctr"/>
+            <a:lstStyle/>
+            <a:p>
+              <a:pPr algn="ctr"/>
+              <a:endParaRPr lang="en-US"/>
+            </a:p>
+          </p:txBody>
+        </p:sp>
+        <p:sp>
+          <p:nvSpPr>
+            <p:cNvPr id="6" name="Elipse 5">
+              <a:extLst>
+                <a:ext uri="{FF2B5EF4-FFF2-40B4-BE49-F238E27FC236}">
+                  <a16:creationId xmlns:a16="http://schemas.microsoft.com/office/drawing/2014/main" id="{D090F780-0FED-4765-AC64-3A5E32B3F356}"/>
+                </a:ext>
+              </a:extLst>
+            </p:cNvPr>
+            <p:cNvSpPr/>
+            <p:nvPr/>
+          </p:nvSpPr>
+          <p:spPr>
+            <a:xfrm>
+              <a:off x="4006850" y="1511300"/>
+              <a:ext cx="647700" cy="647700"/>
+            </a:xfrm>
+            <a:prstGeom prst="ellipse">
+              <a:avLst/>
+            </a:prstGeom>
+            <a:solidFill>
+              <a:srgbClr val="A7CF2D"/>
+            </a:solidFill>
+            <a:ln>
+              <a:noFill/>
+            </a:ln>
+          </p:spPr>
+          <p:style>
+            <a:lnRef idx="2">
+              <a:schemeClr val="accent1">
+                <a:shade val="50000"/>
+              </a:schemeClr>
+            </a:lnRef>
+            <a:fillRef idx="1">
+              <a:schemeClr val="accent1"/>
+            </a:fillRef>
+            <a:effectRef idx="0">
+              <a:schemeClr val="accent1"/>
+            </a:effectRef>
+            <a:fontRef idx="minor">
+              <a:schemeClr val="lt1"/>
+            </a:fontRef>
+          </p:style>
+          <p:txBody>
+            <a:bodyPr rtlCol="0" anchor="ctr"/>
+            <a:lstStyle/>
+            <a:p>
+              <a:pPr algn="ctr"/>
+              <a:endParaRPr lang="en-US"/>
+            </a:p>
+          </p:txBody>
+        </p:sp>
+        <p:sp>
+          <p:nvSpPr>
+            <p:cNvPr id="9" name="Elipse 8">
+              <a:extLst>
+                <a:ext uri="{FF2B5EF4-FFF2-40B4-BE49-F238E27FC236}">
+                  <a16:creationId xmlns:a16="http://schemas.microsoft.com/office/drawing/2014/main" id="{5E5075EF-229B-4050-8366-6DDA49322C86}"/>
+                </a:ext>
+              </a:extLst>
+            </p:cNvPr>
+            <p:cNvSpPr/>
+            <p:nvPr/>
+          </p:nvSpPr>
+          <p:spPr>
+            <a:xfrm>
+              <a:off x="4984750" y="1511300"/>
+              <a:ext cx="647700" cy="647700"/>
+            </a:xfrm>
+            <a:prstGeom prst="ellipse">
+              <a:avLst/>
+            </a:prstGeom>
+            <a:solidFill>
+              <a:srgbClr val="B61700"/>
+            </a:solidFill>
+            <a:ln>
+              <a:noFill/>
+            </a:ln>
+          </p:spPr>
+          <p:style>
+            <a:lnRef idx="2">
+              <a:schemeClr val="accent1">
+                <a:shade val="50000"/>
+              </a:schemeClr>
+            </a:lnRef>
+            <a:fillRef idx="1">
+              <a:schemeClr val="accent1"/>
+            </a:fillRef>
+            <a:effectRef idx="0">
+              <a:schemeClr val="accent1"/>
+            </a:effectRef>
+            <a:fontRef idx="minor">
+              <a:schemeClr val="lt1"/>
+            </a:fontRef>
+          </p:style>
+          <p:txBody>
+            <a:bodyPr rtlCol="0" anchor="ctr"/>
+            <a:lstStyle/>
+            <a:p>
+              <a:pPr algn="ctr"/>
+              <a:endParaRPr lang="en-US"/>
+            </a:p>
+          </p:txBody>
+        </p:sp>
+        <p:sp>
+          <p:nvSpPr>
+            <p:cNvPr id="12" name="Elipse 11">
+              <a:extLst>
+                <a:ext uri="{FF2B5EF4-FFF2-40B4-BE49-F238E27FC236}">
+                  <a16:creationId xmlns:a16="http://schemas.microsoft.com/office/drawing/2014/main" id="{EF6DAAB9-7593-4A9D-A7A4-19D59C23CD99}"/>
+                </a:ext>
+              </a:extLst>
+            </p:cNvPr>
+            <p:cNvSpPr/>
+            <p:nvPr/>
+          </p:nvSpPr>
+          <p:spPr>
+            <a:xfrm>
+              <a:off x="5962650" y="1511300"/>
+              <a:ext cx="647700" cy="647700"/>
+            </a:xfrm>
+            <a:prstGeom prst="ellipse">
+              <a:avLst/>
+            </a:prstGeom>
+            <a:solidFill>
+              <a:srgbClr val="B61700"/>
+            </a:solidFill>
+            <a:ln>
+              <a:noFill/>
+            </a:ln>
+          </p:spPr>
+          <p:style>
+            <a:lnRef idx="2">
+              <a:schemeClr val="accent1">
+                <a:shade val="50000"/>
+              </a:schemeClr>
+            </a:lnRef>
+            <a:fillRef idx="1">
+              <a:schemeClr val="accent1"/>
+            </a:fillRef>
+            <a:effectRef idx="0">
+              <a:schemeClr val="accent1"/>
+            </a:effectRef>
+            <a:fontRef idx="minor">
+              <a:schemeClr val="lt1"/>
+            </a:fontRef>
+          </p:style>
+          <p:txBody>
+            <a:bodyPr rtlCol="0" anchor="ctr"/>
+            <a:lstStyle/>
+            <a:p>
+              <a:pPr algn="ctr"/>
+              <a:endParaRPr lang="en-US"/>
+            </a:p>
+          </p:txBody>
+        </p:sp>
+        <p:sp>
+          <p:nvSpPr>
+            <p:cNvPr id="36" name="Forma Livre: Forma 35">
+              <a:extLst>
+                <a:ext uri="{FF2B5EF4-FFF2-40B4-BE49-F238E27FC236}">
+                  <a16:creationId xmlns:a16="http://schemas.microsoft.com/office/drawing/2014/main" id="{B4ADEFD5-93F6-44C3-BA9F-7796DC92E936}"/>
+                </a:ext>
+              </a:extLst>
+            </p:cNvPr>
+            <p:cNvSpPr/>
+            <p:nvPr/>
+          </p:nvSpPr>
+          <p:spPr>
+            <a:xfrm>
+              <a:off x="815975" y="1438275"/>
+              <a:ext cx="247650" cy="793750"/>
+            </a:xfrm>
+            <a:custGeom>
+              <a:avLst/>
+              <a:gdLst>
+                <a:gd name="connsiteX0" fmla="*/ 0 w 349250"/>
+                <a:gd name="connsiteY0" fmla="*/ 0 h 793750"/>
+                <a:gd name="connsiteX1" fmla="*/ 349250 w 349250"/>
+                <a:gd name="connsiteY1" fmla="*/ 0 h 793750"/>
+                <a:gd name="connsiteX2" fmla="*/ 349250 w 349250"/>
+                <a:gd name="connsiteY2" fmla="*/ 73025 h 793750"/>
+                <a:gd name="connsiteX3" fmla="*/ 80230 w 349250"/>
+                <a:gd name="connsiteY3" fmla="*/ 73025 h 793750"/>
+                <a:gd name="connsiteX4" fmla="*/ 80230 w 349250"/>
+                <a:gd name="connsiteY4" fmla="*/ 720725 h 793750"/>
+                <a:gd name="connsiteX5" fmla="*/ 349250 w 349250"/>
+                <a:gd name="connsiteY5" fmla="*/ 720725 h 793750"/>
+                <a:gd name="connsiteX6" fmla="*/ 349250 w 349250"/>
+                <a:gd name="connsiteY6" fmla="*/ 793750 h 793750"/>
+                <a:gd name="connsiteX7" fmla="*/ 0 w 349250"/>
+                <a:gd name="connsiteY7" fmla="*/ 793750 h 793750"/>
+              </a:gdLst>
+              <a:ahLst/>
+              <a:cxnLst>
+                <a:cxn ang="0">
+                  <a:pos x="connsiteX0" y="connsiteY0"/>
+                </a:cxn>
+                <a:cxn ang="0">
+                  <a:pos x="connsiteX1" y="connsiteY1"/>
+                </a:cxn>
+                <a:cxn ang="0">
+                  <a:pos x="connsiteX2" y="connsiteY2"/>
+                </a:cxn>
+                <a:cxn ang="0">
+                  <a:pos x="connsiteX3" y="connsiteY3"/>
+                </a:cxn>
+                <a:cxn ang="0">
+                  <a:pos x="connsiteX4" y="connsiteY4"/>
+                </a:cxn>
+                <a:cxn ang="0">
+                  <a:pos x="connsiteX5" y="connsiteY5"/>
+                </a:cxn>
+                <a:cxn ang="0">
+                  <a:pos x="connsiteX6" y="connsiteY6"/>
+                </a:cxn>
+                <a:cxn ang="0">
+                  <a:pos x="connsiteX7" y="connsiteY7"/>
+                </a:cxn>
+              </a:cxnLst>
+              <a:rect l="l" t="t" r="r" b="b"/>
+              <a:pathLst>
+                <a:path w="349250" h="793750">
+                  <a:moveTo>
+                    <a:pt x="0" y="0"/>
+                  </a:moveTo>
+                  <a:lnTo>
+                    <a:pt x="349250" y="0"/>
+                  </a:lnTo>
+                  <a:lnTo>
+                    <a:pt x="349250" y="73025"/>
+                  </a:lnTo>
+                  <a:lnTo>
+                    <a:pt x="80230" y="73025"/>
+                  </a:lnTo>
+                  <a:lnTo>
+                    <a:pt x="80230" y="720725"/>
+                  </a:lnTo>
+                  <a:lnTo>
+                    <a:pt x="349250" y="720725"/>
+                  </a:lnTo>
+                  <a:lnTo>
+                    <a:pt x="349250" y="793750"/>
+                  </a:lnTo>
+                  <a:lnTo>
+                    <a:pt x="0" y="793750"/>
+                  </a:lnTo>
+                  <a:close/>
+                </a:path>
+              </a:pathLst>
+            </a:custGeom>
+            <a:solidFill>
+              <a:srgbClr val="03DAC6"/>
+            </a:solidFill>
+            <a:ln>
+              <a:noFill/>
+            </a:ln>
+          </p:spPr>
+          <p:style>
+            <a:lnRef idx="2">
+              <a:schemeClr val="accent1">
+                <a:shade val="50000"/>
+              </a:schemeClr>
+            </a:lnRef>
+            <a:fillRef idx="1">
+              <a:schemeClr val="accent1"/>
+            </a:fillRef>
+            <a:effectRef idx="0">
+              <a:schemeClr val="accent1"/>
+            </a:effectRef>
+            <a:fontRef idx="minor">
+              <a:schemeClr val="lt1"/>
+            </a:fontRef>
+          </p:style>
+          <p:txBody>
+            <a:bodyPr wrap="square" rtlCol="0" anchor="ctr">
+              <a:noAutofit/>
+            </a:bodyPr>
+            <a:lstStyle/>
+            <a:p>
+              <a:pPr algn="ctr"/>
+              <a:endParaRPr lang="en-US"/>
+            </a:p>
+          </p:txBody>
+        </p:sp>
+        <p:sp>
+          <p:nvSpPr>
+            <p:cNvPr id="37" name="Forma Livre: Forma 36">
+              <a:extLst>
+                <a:ext uri="{FF2B5EF4-FFF2-40B4-BE49-F238E27FC236}">
+                  <a16:creationId xmlns:a16="http://schemas.microsoft.com/office/drawing/2014/main" id="{B0450489-704D-4942-BB4D-E3BEA2E05AFC}"/>
+                </a:ext>
+              </a:extLst>
+            </p:cNvPr>
+            <p:cNvSpPr/>
+            <p:nvPr/>
+          </p:nvSpPr>
+          <p:spPr>
+            <a:xfrm flipH="1">
+              <a:off x="3457575" y="1438275"/>
+              <a:ext cx="247650" cy="793750"/>
+            </a:xfrm>
+            <a:custGeom>
+              <a:avLst/>
+              <a:gdLst>
+                <a:gd name="connsiteX0" fmla="*/ 0 w 349250"/>
+                <a:gd name="connsiteY0" fmla="*/ 0 h 793750"/>
+                <a:gd name="connsiteX1" fmla="*/ 349250 w 349250"/>
+                <a:gd name="connsiteY1" fmla="*/ 0 h 793750"/>
+                <a:gd name="connsiteX2" fmla="*/ 349250 w 349250"/>
+                <a:gd name="connsiteY2" fmla="*/ 73025 h 793750"/>
+                <a:gd name="connsiteX3" fmla="*/ 80230 w 349250"/>
+                <a:gd name="connsiteY3" fmla="*/ 73025 h 793750"/>
+                <a:gd name="connsiteX4" fmla="*/ 80230 w 349250"/>
+                <a:gd name="connsiteY4" fmla="*/ 720725 h 793750"/>
+                <a:gd name="connsiteX5" fmla="*/ 349250 w 349250"/>
+                <a:gd name="connsiteY5" fmla="*/ 720725 h 793750"/>
+                <a:gd name="connsiteX6" fmla="*/ 349250 w 349250"/>
+                <a:gd name="connsiteY6" fmla="*/ 793750 h 793750"/>
+                <a:gd name="connsiteX7" fmla="*/ 0 w 349250"/>
+                <a:gd name="connsiteY7" fmla="*/ 793750 h 793750"/>
+              </a:gdLst>
+              <a:ahLst/>
+              <a:cxnLst>
+                <a:cxn ang="0">
+                  <a:pos x="connsiteX0" y="connsiteY0"/>
+                </a:cxn>
+                <a:cxn ang="0">
+                  <a:pos x="connsiteX1" y="connsiteY1"/>
+                </a:cxn>
+                <a:cxn ang="0">
+                  <a:pos x="connsiteX2" y="connsiteY2"/>
+                </a:cxn>
+                <a:cxn ang="0">
+                  <a:pos x="connsiteX3" y="connsiteY3"/>
+                </a:cxn>
+                <a:cxn ang="0">
+                  <a:pos x="connsiteX4" y="connsiteY4"/>
+                </a:cxn>
+                <a:cxn ang="0">
+                  <a:pos x="connsiteX5" y="connsiteY5"/>
+                </a:cxn>
+                <a:cxn ang="0">
+                  <a:pos x="connsiteX6" y="connsiteY6"/>
+                </a:cxn>
+                <a:cxn ang="0">
+                  <a:pos x="connsiteX7" y="connsiteY7"/>
+                </a:cxn>
+              </a:cxnLst>
+              <a:rect l="l" t="t" r="r" b="b"/>
+              <a:pathLst>
+                <a:path w="349250" h="793750">
+                  <a:moveTo>
+                    <a:pt x="0" y="0"/>
+                  </a:moveTo>
+                  <a:lnTo>
+                    <a:pt x="349250" y="0"/>
+                  </a:lnTo>
+                  <a:lnTo>
+                    <a:pt x="349250" y="73025"/>
+                  </a:lnTo>
+                  <a:lnTo>
+                    <a:pt x="80230" y="73025"/>
+                  </a:lnTo>
+                  <a:lnTo>
+                    <a:pt x="80230" y="720725"/>
+                  </a:lnTo>
+                  <a:lnTo>
+                    <a:pt x="349250" y="720725"/>
+                  </a:lnTo>
+                  <a:lnTo>
+                    <a:pt x="349250" y="793750"/>
+                  </a:lnTo>
+                  <a:lnTo>
+                    <a:pt x="0" y="793750"/>
+                  </a:lnTo>
+                  <a:close/>
+                </a:path>
+              </a:pathLst>
+            </a:custGeom>
+            <a:solidFill>
+              <a:srgbClr val="03DAC6"/>
+            </a:solidFill>
+            <a:ln>
+              <a:noFill/>
+            </a:ln>
+          </p:spPr>
+          <p:style>
+            <a:lnRef idx="2">
+              <a:schemeClr val="accent1">
+                <a:shade val="50000"/>
+              </a:schemeClr>
+            </a:lnRef>
+            <a:fillRef idx="1">
+              <a:schemeClr val="accent1"/>
+            </a:fillRef>
+            <a:effectRef idx="0">
+              <a:schemeClr val="accent1"/>
+            </a:effectRef>
+            <a:fontRef idx="minor">
+              <a:schemeClr val="lt1"/>
+            </a:fontRef>
+          </p:style>
+          <p:txBody>
+            <a:bodyPr wrap="square" rtlCol="0" anchor="ctr">
+              <a:noAutofit/>
+            </a:bodyPr>
+            <a:lstStyle/>
+            <a:p>
+              <a:pPr algn="ctr"/>
+              <a:endParaRPr lang="en-US"/>
+            </a:p>
+          </p:txBody>
+        </p:sp>
+        <p:sp>
+          <p:nvSpPr>
+            <p:cNvPr id="43" name="Seta: para Baixo 42">
+              <a:extLst>
+                <a:ext uri="{FF2B5EF4-FFF2-40B4-BE49-F238E27FC236}">
+                  <a16:creationId xmlns:a16="http://schemas.microsoft.com/office/drawing/2014/main" id="{0FD4FB4B-7557-458A-933C-0B45DEE6D599}"/>
+                </a:ext>
+              </a:extLst>
+            </p:cNvPr>
+            <p:cNvSpPr/>
+            <p:nvPr/>
+          </p:nvSpPr>
+          <p:spPr>
+            <a:xfrm>
+              <a:off x="2105025" y="2381250"/>
+              <a:ext cx="320675" cy="461665"/>
+            </a:xfrm>
+            <a:prstGeom prst="downArrow">
+              <a:avLst/>
+            </a:prstGeom>
+            <a:solidFill>
+              <a:srgbClr val="03DAC6"/>
+            </a:solidFill>
+            <a:ln>
+              <a:noFill/>
+            </a:ln>
+          </p:spPr>
+          <p:style>
+            <a:lnRef idx="2">
+              <a:schemeClr val="accent1">
+                <a:shade val="50000"/>
+              </a:schemeClr>
+            </a:lnRef>
+            <a:fillRef idx="1">
+              <a:schemeClr val="accent1"/>
+            </a:fillRef>
+            <a:effectRef idx="0">
+              <a:schemeClr val="accent1"/>
+            </a:effectRef>
+            <a:fontRef idx="minor">
+              <a:schemeClr val="lt1"/>
+            </a:fontRef>
+          </p:style>
+          <p:txBody>
+            <a:bodyPr rtlCol="0" anchor="ctr"/>
+            <a:lstStyle/>
+            <a:p>
+              <a:pPr algn="ctr"/>
+              <a:endParaRPr lang="en-US"/>
+            </a:p>
+          </p:txBody>
+        </p:sp>
+        <p:sp>
+          <p:nvSpPr>
+            <p:cNvPr id="45" name="CaixaDeTexto 44">
+              <a:extLst>
+                <a:ext uri="{FF2B5EF4-FFF2-40B4-BE49-F238E27FC236}">
+                  <a16:creationId xmlns:a16="http://schemas.microsoft.com/office/drawing/2014/main" id="{F3176579-1E78-489B-AF39-1A63AA99ECE3}"/>
+                </a:ext>
+              </a:extLst>
+            </p:cNvPr>
+            <p:cNvSpPr txBox="1"/>
+            <p:nvPr/>
+          </p:nvSpPr>
+          <p:spPr>
+            <a:xfrm>
+              <a:off x="1628856" y="3105150"/>
+              <a:ext cx="1263487" cy="461665"/>
+            </a:xfrm>
+            <a:prstGeom prst="rect">
+              <a:avLst/>
+            </a:prstGeom>
+            <a:noFill/>
+          </p:spPr>
+          <p:txBody>
+            <a:bodyPr wrap="none" rtlCol="0">
+              <a:spAutoFit/>
+            </a:bodyPr>
+            <a:lstStyle/>
+            <a:p>
+              <a:r>
+                <a:rPr lang="pt-BR" sz="2400" dirty="0">
+                  <a:solidFill>
+                    <a:srgbClr val="A7CF2D"/>
+                  </a:solidFill>
+                  <a:latin typeface="Arial" panose="020B0604020202020204" pitchFamily="34" charset="0"/>
+                  <a:cs typeface="Arial" panose="020B0604020202020204" pitchFamily="34" charset="0"/>
+                </a:rPr>
+                <a:t>Positivo</a:t>
+              </a:r>
+              <a:endParaRPr lang="en-US" sz="2400" dirty="0">
+                <a:solidFill>
+                  <a:srgbClr val="A7CF2D"/>
+                </a:solidFill>
+                <a:latin typeface="Arial" panose="020B0604020202020204" pitchFamily="34" charset="0"/>
+                <a:cs typeface="Arial" panose="020B0604020202020204" pitchFamily="34" charset="0"/>
+              </a:endParaRPr>
+            </a:p>
+          </p:txBody>
+        </p:sp>
+        <p:sp>
+          <p:nvSpPr>
+            <p:cNvPr id="46" name="Forma Livre: Forma 45">
+              <a:extLst>
+                <a:ext uri="{FF2B5EF4-FFF2-40B4-BE49-F238E27FC236}">
+                  <a16:creationId xmlns:a16="http://schemas.microsoft.com/office/drawing/2014/main" id="{096415DB-0E74-4C1F-89CB-FD466FD3AB9A}"/>
+                </a:ext>
+              </a:extLst>
+            </p:cNvPr>
+            <p:cNvSpPr/>
+            <p:nvPr/>
+          </p:nvSpPr>
+          <p:spPr>
+            <a:xfrm>
+              <a:off x="3863975" y="1438275"/>
+              <a:ext cx="247650" cy="793750"/>
+            </a:xfrm>
+            <a:custGeom>
+              <a:avLst/>
+              <a:gdLst>
+                <a:gd name="connsiteX0" fmla="*/ 0 w 349250"/>
+                <a:gd name="connsiteY0" fmla="*/ 0 h 793750"/>
+                <a:gd name="connsiteX1" fmla="*/ 349250 w 349250"/>
+                <a:gd name="connsiteY1" fmla="*/ 0 h 793750"/>
+                <a:gd name="connsiteX2" fmla="*/ 349250 w 349250"/>
+                <a:gd name="connsiteY2" fmla="*/ 73025 h 793750"/>
+                <a:gd name="connsiteX3" fmla="*/ 80230 w 349250"/>
+                <a:gd name="connsiteY3" fmla="*/ 73025 h 793750"/>
+                <a:gd name="connsiteX4" fmla="*/ 80230 w 349250"/>
+                <a:gd name="connsiteY4" fmla="*/ 720725 h 793750"/>
+                <a:gd name="connsiteX5" fmla="*/ 349250 w 349250"/>
+                <a:gd name="connsiteY5" fmla="*/ 720725 h 793750"/>
+                <a:gd name="connsiteX6" fmla="*/ 349250 w 349250"/>
+                <a:gd name="connsiteY6" fmla="*/ 793750 h 793750"/>
+                <a:gd name="connsiteX7" fmla="*/ 0 w 349250"/>
+                <a:gd name="connsiteY7" fmla="*/ 793750 h 793750"/>
+              </a:gdLst>
+              <a:ahLst/>
+              <a:cxnLst>
+                <a:cxn ang="0">
+                  <a:pos x="connsiteX0" y="connsiteY0"/>
+                </a:cxn>
+                <a:cxn ang="0">
+                  <a:pos x="connsiteX1" y="connsiteY1"/>
+                </a:cxn>
+                <a:cxn ang="0">
+                  <a:pos x="connsiteX2" y="connsiteY2"/>
+                </a:cxn>
+                <a:cxn ang="0">
+                  <a:pos x="connsiteX3" y="connsiteY3"/>
+                </a:cxn>
+                <a:cxn ang="0">
+                  <a:pos x="connsiteX4" y="connsiteY4"/>
+                </a:cxn>
+                <a:cxn ang="0">
+                  <a:pos x="connsiteX5" y="connsiteY5"/>
+                </a:cxn>
+                <a:cxn ang="0">
+                  <a:pos x="connsiteX6" y="connsiteY6"/>
+                </a:cxn>
+                <a:cxn ang="0">
+                  <a:pos x="connsiteX7" y="connsiteY7"/>
+                </a:cxn>
+              </a:cxnLst>
+              <a:rect l="l" t="t" r="r" b="b"/>
+              <a:pathLst>
+                <a:path w="349250" h="793750">
+                  <a:moveTo>
+                    <a:pt x="0" y="0"/>
+                  </a:moveTo>
+                  <a:lnTo>
+                    <a:pt x="349250" y="0"/>
+                  </a:lnTo>
+                  <a:lnTo>
+                    <a:pt x="349250" y="73025"/>
+                  </a:lnTo>
+                  <a:lnTo>
+                    <a:pt x="80230" y="73025"/>
+                  </a:lnTo>
+                  <a:lnTo>
+                    <a:pt x="80230" y="720725"/>
+                  </a:lnTo>
+                  <a:lnTo>
+                    <a:pt x="349250" y="720725"/>
+                  </a:lnTo>
+                  <a:lnTo>
+                    <a:pt x="349250" y="793750"/>
+                  </a:lnTo>
+                  <a:lnTo>
+                    <a:pt x="0" y="793750"/>
+                  </a:lnTo>
+                  <a:close/>
+                </a:path>
+              </a:pathLst>
+            </a:custGeom>
+            <a:solidFill>
+              <a:srgbClr val="03DAC6"/>
+            </a:solidFill>
+            <a:ln>
+              <a:noFill/>
+            </a:ln>
+          </p:spPr>
+          <p:style>
+            <a:lnRef idx="2">
+              <a:schemeClr val="accent1">
+                <a:shade val="50000"/>
+              </a:schemeClr>
+            </a:lnRef>
+            <a:fillRef idx="1">
+              <a:schemeClr val="accent1"/>
+            </a:fillRef>
+            <a:effectRef idx="0">
+              <a:schemeClr val="accent1"/>
+            </a:effectRef>
+            <a:fontRef idx="minor">
+              <a:schemeClr val="lt1"/>
+            </a:fontRef>
+          </p:style>
+          <p:txBody>
+            <a:bodyPr wrap="square" rtlCol="0" anchor="ctr">
+              <a:noAutofit/>
+            </a:bodyPr>
+            <a:lstStyle/>
+            <a:p>
+              <a:pPr algn="ctr"/>
+              <a:endParaRPr lang="en-US"/>
+            </a:p>
+          </p:txBody>
+        </p:sp>
+        <p:sp>
+          <p:nvSpPr>
+            <p:cNvPr id="47" name="Forma Livre: Forma 46">
+              <a:extLst>
+                <a:ext uri="{FF2B5EF4-FFF2-40B4-BE49-F238E27FC236}">
+                  <a16:creationId xmlns:a16="http://schemas.microsoft.com/office/drawing/2014/main" id="{CD7622C2-7473-4A35-885A-E327276E8514}"/>
+                </a:ext>
+              </a:extLst>
+            </p:cNvPr>
+            <p:cNvSpPr/>
+            <p:nvPr/>
+          </p:nvSpPr>
+          <p:spPr>
+            <a:xfrm flipH="1">
+              <a:off x="6473825" y="1438275"/>
+              <a:ext cx="247650" cy="793750"/>
+            </a:xfrm>
+            <a:custGeom>
+              <a:avLst/>
+              <a:gdLst>
+                <a:gd name="connsiteX0" fmla="*/ 0 w 349250"/>
+                <a:gd name="connsiteY0" fmla="*/ 0 h 793750"/>
+                <a:gd name="connsiteX1" fmla="*/ 349250 w 349250"/>
+                <a:gd name="connsiteY1" fmla="*/ 0 h 793750"/>
+                <a:gd name="connsiteX2" fmla="*/ 349250 w 349250"/>
+                <a:gd name="connsiteY2" fmla="*/ 73025 h 793750"/>
+                <a:gd name="connsiteX3" fmla="*/ 80230 w 349250"/>
+                <a:gd name="connsiteY3" fmla="*/ 73025 h 793750"/>
+                <a:gd name="connsiteX4" fmla="*/ 80230 w 349250"/>
+                <a:gd name="connsiteY4" fmla="*/ 720725 h 793750"/>
+                <a:gd name="connsiteX5" fmla="*/ 349250 w 349250"/>
+                <a:gd name="connsiteY5" fmla="*/ 720725 h 793750"/>
+                <a:gd name="connsiteX6" fmla="*/ 349250 w 349250"/>
+                <a:gd name="connsiteY6" fmla="*/ 793750 h 793750"/>
+                <a:gd name="connsiteX7" fmla="*/ 0 w 349250"/>
+                <a:gd name="connsiteY7" fmla="*/ 793750 h 793750"/>
+              </a:gdLst>
+              <a:ahLst/>
+              <a:cxnLst>
+                <a:cxn ang="0">
+                  <a:pos x="connsiteX0" y="connsiteY0"/>
+                </a:cxn>
+                <a:cxn ang="0">
+                  <a:pos x="connsiteX1" y="connsiteY1"/>
+                </a:cxn>
+                <a:cxn ang="0">
+                  <a:pos x="connsiteX2" y="connsiteY2"/>
+                </a:cxn>
+                <a:cxn ang="0">
+                  <a:pos x="connsiteX3" y="connsiteY3"/>
+                </a:cxn>
+                <a:cxn ang="0">
+                  <a:pos x="connsiteX4" y="connsiteY4"/>
+                </a:cxn>
+                <a:cxn ang="0">
+                  <a:pos x="connsiteX5" y="connsiteY5"/>
+                </a:cxn>
+                <a:cxn ang="0">
+                  <a:pos x="connsiteX6" y="connsiteY6"/>
+                </a:cxn>
+                <a:cxn ang="0">
+                  <a:pos x="connsiteX7" y="connsiteY7"/>
+                </a:cxn>
+              </a:cxnLst>
+              <a:rect l="l" t="t" r="r" b="b"/>
+              <a:pathLst>
+                <a:path w="349250" h="793750">
+                  <a:moveTo>
+                    <a:pt x="0" y="0"/>
+                  </a:moveTo>
+                  <a:lnTo>
+                    <a:pt x="349250" y="0"/>
+                  </a:lnTo>
+                  <a:lnTo>
+                    <a:pt x="349250" y="73025"/>
+                  </a:lnTo>
+                  <a:lnTo>
+                    <a:pt x="80230" y="73025"/>
+                  </a:lnTo>
+                  <a:lnTo>
+                    <a:pt x="80230" y="720725"/>
+                  </a:lnTo>
+                  <a:lnTo>
+                    <a:pt x="349250" y="720725"/>
+                  </a:lnTo>
+                  <a:lnTo>
+                    <a:pt x="349250" y="793750"/>
+                  </a:lnTo>
+                  <a:lnTo>
+                    <a:pt x="0" y="793750"/>
+                  </a:lnTo>
+                  <a:close/>
+                </a:path>
+              </a:pathLst>
+            </a:custGeom>
+            <a:solidFill>
+              <a:srgbClr val="03DAC6"/>
+            </a:solidFill>
+            <a:ln>
+              <a:noFill/>
+            </a:ln>
+          </p:spPr>
+          <p:style>
+            <a:lnRef idx="2">
+              <a:schemeClr val="accent1">
+                <a:shade val="50000"/>
+              </a:schemeClr>
+            </a:lnRef>
+            <a:fillRef idx="1">
+              <a:schemeClr val="accent1"/>
+            </a:fillRef>
+            <a:effectRef idx="0">
+              <a:schemeClr val="accent1"/>
+            </a:effectRef>
+            <a:fontRef idx="minor">
+              <a:schemeClr val="lt1"/>
+            </a:fontRef>
+          </p:style>
+          <p:txBody>
+            <a:bodyPr wrap="square" rtlCol="0" anchor="ctr">
+              <a:noAutofit/>
+            </a:bodyPr>
+            <a:lstStyle/>
+            <a:p>
+              <a:pPr algn="ctr"/>
+              <a:endParaRPr lang="en-US"/>
+            </a:p>
+          </p:txBody>
+        </p:sp>
+        <p:sp>
+          <p:nvSpPr>
+            <p:cNvPr id="48" name="Seta: para Baixo 47">
+              <a:extLst>
+                <a:ext uri="{FF2B5EF4-FFF2-40B4-BE49-F238E27FC236}">
+                  <a16:creationId xmlns:a16="http://schemas.microsoft.com/office/drawing/2014/main" id="{66239EE6-74B1-4F3C-AE91-9C9960C531CC}"/>
+                </a:ext>
+              </a:extLst>
+            </p:cNvPr>
+            <p:cNvSpPr/>
+            <p:nvPr/>
+          </p:nvSpPr>
+          <p:spPr>
+            <a:xfrm>
+              <a:off x="5132469" y="2381250"/>
+              <a:ext cx="320675" cy="461665"/>
+            </a:xfrm>
+            <a:prstGeom prst="downArrow">
+              <a:avLst/>
+            </a:prstGeom>
+            <a:solidFill>
+              <a:srgbClr val="03DAC6"/>
+            </a:solidFill>
+            <a:ln>
+              <a:noFill/>
+            </a:ln>
+          </p:spPr>
+          <p:style>
+            <a:lnRef idx="2">
+              <a:schemeClr val="accent1">
+                <a:shade val="50000"/>
+              </a:schemeClr>
+            </a:lnRef>
+            <a:fillRef idx="1">
+              <a:schemeClr val="accent1"/>
+            </a:fillRef>
+            <a:effectRef idx="0">
+              <a:schemeClr val="accent1"/>
+            </a:effectRef>
+            <a:fontRef idx="minor">
+              <a:schemeClr val="lt1"/>
+            </a:fontRef>
+          </p:style>
+          <p:txBody>
+            <a:bodyPr rtlCol="0" anchor="ctr"/>
+            <a:lstStyle/>
+            <a:p>
+              <a:pPr algn="ctr"/>
+              <a:endParaRPr lang="en-US"/>
+            </a:p>
+          </p:txBody>
+        </p:sp>
+        <p:sp>
+          <p:nvSpPr>
+            <p:cNvPr id="49" name="CaixaDeTexto 48">
+              <a:extLst>
+                <a:ext uri="{FF2B5EF4-FFF2-40B4-BE49-F238E27FC236}">
+                  <a16:creationId xmlns:a16="http://schemas.microsoft.com/office/drawing/2014/main" id="{9C634E72-83B3-441B-9818-C8175216F406}"/>
+                </a:ext>
+              </a:extLst>
+            </p:cNvPr>
+            <p:cNvSpPr txBox="1"/>
+            <p:nvPr/>
+          </p:nvSpPr>
+          <p:spPr>
+            <a:xfrm>
+              <a:off x="4591050" y="3105150"/>
+              <a:ext cx="1401346" cy="461665"/>
+            </a:xfrm>
+            <a:prstGeom prst="rect">
+              <a:avLst/>
+            </a:prstGeom>
+            <a:noFill/>
+          </p:spPr>
+          <p:txBody>
+            <a:bodyPr wrap="none" rtlCol="0">
+              <a:spAutoFit/>
+            </a:bodyPr>
+            <a:lstStyle/>
+            <a:p>
+              <a:r>
+                <a:rPr lang="pt-BR" sz="2400" dirty="0">
+                  <a:solidFill>
+                    <a:srgbClr val="B61700"/>
+                  </a:solidFill>
+                  <a:latin typeface="Arial" panose="020B0604020202020204" pitchFamily="34" charset="0"/>
+                  <a:cs typeface="Arial" panose="020B0604020202020204" pitchFamily="34" charset="0"/>
+                </a:rPr>
+                <a:t>Negativo</a:t>
+              </a:r>
+              <a:endParaRPr lang="en-US" sz="2400" dirty="0">
+                <a:solidFill>
+                  <a:srgbClr val="B61700"/>
+                </a:solidFill>
+                <a:latin typeface="Arial" panose="020B0604020202020204" pitchFamily="34" charset="0"/>
+                <a:cs typeface="Arial" panose="020B0604020202020204" pitchFamily="34" charset="0"/>
+              </a:endParaRPr>
+            </a:p>
+          </p:txBody>
+        </p:sp>
+        <p:sp>
+          <p:nvSpPr>
+            <p:cNvPr id="50" name="Forma Livre: Forma 49">
+              <a:extLst>
+                <a:ext uri="{FF2B5EF4-FFF2-40B4-BE49-F238E27FC236}">
+                  <a16:creationId xmlns:a16="http://schemas.microsoft.com/office/drawing/2014/main" id="{10F00801-6722-4451-A6FF-64D9FDFB829D}"/>
+                </a:ext>
+              </a:extLst>
+            </p:cNvPr>
+            <p:cNvSpPr/>
+            <p:nvPr/>
+          </p:nvSpPr>
+          <p:spPr>
+            <a:xfrm>
+              <a:off x="1598695" y="2939107"/>
+              <a:ext cx="247650" cy="793750"/>
+            </a:xfrm>
+            <a:custGeom>
+              <a:avLst/>
+              <a:gdLst>
+                <a:gd name="connsiteX0" fmla="*/ 0 w 349250"/>
+                <a:gd name="connsiteY0" fmla="*/ 0 h 793750"/>
+                <a:gd name="connsiteX1" fmla="*/ 349250 w 349250"/>
+                <a:gd name="connsiteY1" fmla="*/ 0 h 793750"/>
+                <a:gd name="connsiteX2" fmla="*/ 349250 w 349250"/>
+                <a:gd name="connsiteY2" fmla="*/ 73025 h 793750"/>
+                <a:gd name="connsiteX3" fmla="*/ 80230 w 349250"/>
+                <a:gd name="connsiteY3" fmla="*/ 73025 h 793750"/>
+                <a:gd name="connsiteX4" fmla="*/ 80230 w 349250"/>
+                <a:gd name="connsiteY4" fmla="*/ 720725 h 793750"/>
+                <a:gd name="connsiteX5" fmla="*/ 349250 w 349250"/>
+                <a:gd name="connsiteY5" fmla="*/ 720725 h 793750"/>
+                <a:gd name="connsiteX6" fmla="*/ 349250 w 349250"/>
+                <a:gd name="connsiteY6" fmla="*/ 793750 h 793750"/>
+                <a:gd name="connsiteX7" fmla="*/ 0 w 349250"/>
+                <a:gd name="connsiteY7" fmla="*/ 793750 h 793750"/>
+              </a:gdLst>
+              <a:ahLst/>
+              <a:cxnLst>
+                <a:cxn ang="0">
+                  <a:pos x="connsiteX0" y="connsiteY0"/>
+                </a:cxn>
+                <a:cxn ang="0">
+                  <a:pos x="connsiteX1" y="connsiteY1"/>
+                </a:cxn>
+                <a:cxn ang="0">
+                  <a:pos x="connsiteX2" y="connsiteY2"/>
+                </a:cxn>
+                <a:cxn ang="0">
+                  <a:pos x="connsiteX3" y="connsiteY3"/>
+                </a:cxn>
+                <a:cxn ang="0">
+                  <a:pos x="connsiteX4" y="connsiteY4"/>
+                </a:cxn>
+                <a:cxn ang="0">
+                  <a:pos x="connsiteX5" y="connsiteY5"/>
+                </a:cxn>
+                <a:cxn ang="0">
+                  <a:pos x="connsiteX6" y="connsiteY6"/>
+                </a:cxn>
+                <a:cxn ang="0">
+                  <a:pos x="connsiteX7" y="connsiteY7"/>
+                </a:cxn>
+              </a:cxnLst>
+              <a:rect l="l" t="t" r="r" b="b"/>
+              <a:pathLst>
+                <a:path w="349250" h="793750">
+                  <a:moveTo>
+                    <a:pt x="0" y="0"/>
+                  </a:moveTo>
+                  <a:lnTo>
+                    <a:pt x="349250" y="0"/>
+                  </a:lnTo>
+                  <a:lnTo>
+                    <a:pt x="349250" y="73025"/>
+                  </a:lnTo>
+                  <a:lnTo>
+                    <a:pt x="80230" y="73025"/>
+                  </a:lnTo>
+                  <a:lnTo>
+                    <a:pt x="80230" y="720725"/>
+                  </a:lnTo>
+                  <a:lnTo>
+                    <a:pt x="349250" y="720725"/>
+                  </a:lnTo>
+                  <a:lnTo>
+                    <a:pt x="349250" y="793750"/>
+                  </a:lnTo>
+                  <a:lnTo>
+                    <a:pt x="0" y="793750"/>
+                  </a:lnTo>
+                  <a:close/>
+                </a:path>
+              </a:pathLst>
+            </a:custGeom>
+            <a:solidFill>
+              <a:srgbClr val="03DAC6"/>
+            </a:solidFill>
+            <a:ln>
+              <a:noFill/>
+            </a:ln>
+          </p:spPr>
+          <p:style>
+            <a:lnRef idx="2">
+              <a:schemeClr val="accent1">
+                <a:shade val="50000"/>
+              </a:schemeClr>
+            </a:lnRef>
+            <a:fillRef idx="1">
+              <a:schemeClr val="accent1"/>
+            </a:fillRef>
+            <a:effectRef idx="0">
+              <a:schemeClr val="accent1"/>
+            </a:effectRef>
+            <a:fontRef idx="minor">
+              <a:schemeClr val="lt1"/>
+            </a:fontRef>
+          </p:style>
+          <p:txBody>
+            <a:bodyPr wrap="square" rtlCol="0" anchor="ctr">
+              <a:noAutofit/>
+            </a:bodyPr>
+            <a:lstStyle/>
+            <a:p>
+              <a:pPr algn="ctr"/>
+              <a:endParaRPr lang="en-US"/>
+            </a:p>
+          </p:txBody>
+        </p:sp>
+        <p:sp>
+          <p:nvSpPr>
+            <p:cNvPr id="51" name="Forma Livre: Forma 50">
+              <a:extLst>
+                <a:ext uri="{FF2B5EF4-FFF2-40B4-BE49-F238E27FC236}">
+                  <a16:creationId xmlns:a16="http://schemas.microsoft.com/office/drawing/2014/main" id="{F655AC79-09CC-4DDD-895E-BF566B9A6415}"/>
+                </a:ext>
+              </a:extLst>
+            </p:cNvPr>
+            <p:cNvSpPr/>
+            <p:nvPr/>
+          </p:nvSpPr>
+          <p:spPr>
+            <a:xfrm>
+              <a:off x="4581198" y="2939107"/>
+              <a:ext cx="247650" cy="793750"/>
+            </a:xfrm>
+            <a:custGeom>
+              <a:avLst/>
+              <a:gdLst>
+                <a:gd name="connsiteX0" fmla="*/ 0 w 349250"/>
+                <a:gd name="connsiteY0" fmla="*/ 0 h 793750"/>
+                <a:gd name="connsiteX1" fmla="*/ 349250 w 349250"/>
+                <a:gd name="connsiteY1" fmla="*/ 0 h 793750"/>
+                <a:gd name="connsiteX2" fmla="*/ 349250 w 349250"/>
+                <a:gd name="connsiteY2" fmla="*/ 73025 h 793750"/>
+                <a:gd name="connsiteX3" fmla="*/ 80230 w 349250"/>
+                <a:gd name="connsiteY3" fmla="*/ 73025 h 793750"/>
+                <a:gd name="connsiteX4" fmla="*/ 80230 w 349250"/>
+                <a:gd name="connsiteY4" fmla="*/ 720725 h 793750"/>
+                <a:gd name="connsiteX5" fmla="*/ 349250 w 349250"/>
+                <a:gd name="connsiteY5" fmla="*/ 720725 h 793750"/>
+                <a:gd name="connsiteX6" fmla="*/ 349250 w 349250"/>
+                <a:gd name="connsiteY6" fmla="*/ 793750 h 793750"/>
+                <a:gd name="connsiteX7" fmla="*/ 0 w 349250"/>
+                <a:gd name="connsiteY7" fmla="*/ 793750 h 793750"/>
+              </a:gdLst>
+              <a:ahLst/>
+              <a:cxnLst>
+                <a:cxn ang="0">
+                  <a:pos x="connsiteX0" y="connsiteY0"/>
+                </a:cxn>
+                <a:cxn ang="0">
+                  <a:pos x="connsiteX1" y="connsiteY1"/>
+                </a:cxn>
+                <a:cxn ang="0">
+                  <a:pos x="connsiteX2" y="connsiteY2"/>
+                </a:cxn>
+                <a:cxn ang="0">
+                  <a:pos x="connsiteX3" y="connsiteY3"/>
+                </a:cxn>
+                <a:cxn ang="0">
+                  <a:pos x="connsiteX4" y="connsiteY4"/>
+                </a:cxn>
+                <a:cxn ang="0">
+                  <a:pos x="connsiteX5" y="connsiteY5"/>
+                </a:cxn>
+                <a:cxn ang="0">
+                  <a:pos x="connsiteX6" y="connsiteY6"/>
+                </a:cxn>
+                <a:cxn ang="0">
+                  <a:pos x="connsiteX7" y="connsiteY7"/>
+                </a:cxn>
+              </a:cxnLst>
+              <a:rect l="l" t="t" r="r" b="b"/>
+              <a:pathLst>
+                <a:path w="349250" h="793750">
+                  <a:moveTo>
+                    <a:pt x="0" y="0"/>
+                  </a:moveTo>
+                  <a:lnTo>
+                    <a:pt x="349250" y="0"/>
+                  </a:lnTo>
+                  <a:lnTo>
+                    <a:pt x="349250" y="73025"/>
+                  </a:lnTo>
+                  <a:lnTo>
+                    <a:pt x="80230" y="73025"/>
+                  </a:lnTo>
+                  <a:lnTo>
+                    <a:pt x="80230" y="720725"/>
+                  </a:lnTo>
+                  <a:lnTo>
+                    <a:pt x="349250" y="720725"/>
+                  </a:lnTo>
+                  <a:lnTo>
+                    <a:pt x="349250" y="793750"/>
+                  </a:lnTo>
+                  <a:lnTo>
+                    <a:pt x="0" y="793750"/>
+                  </a:lnTo>
+                  <a:close/>
+                </a:path>
+              </a:pathLst>
+            </a:custGeom>
+            <a:solidFill>
+              <a:srgbClr val="03DAC6"/>
+            </a:solidFill>
+            <a:ln>
+              <a:noFill/>
+            </a:ln>
+          </p:spPr>
+          <p:style>
+            <a:lnRef idx="2">
+              <a:schemeClr val="accent1">
+                <a:shade val="50000"/>
+              </a:schemeClr>
+            </a:lnRef>
+            <a:fillRef idx="1">
+              <a:schemeClr val="accent1"/>
+            </a:fillRef>
+            <a:effectRef idx="0">
+              <a:schemeClr val="accent1"/>
+            </a:effectRef>
+            <a:fontRef idx="minor">
+              <a:schemeClr val="lt1"/>
+            </a:fontRef>
+          </p:style>
+          <p:txBody>
+            <a:bodyPr wrap="square" rtlCol="0" anchor="ctr">
+              <a:noAutofit/>
+            </a:bodyPr>
+            <a:lstStyle/>
+            <a:p>
+              <a:pPr algn="ctr"/>
+              <a:endParaRPr lang="en-US"/>
+            </a:p>
+          </p:txBody>
+        </p:sp>
+        <p:sp>
+          <p:nvSpPr>
+            <p:cNvPr id="52" name="Forma Livre: Forma 51">
+              <a:extLst>
+                <a:ext uri="{FF2B5EF4-FFF2-40B4-BE49-F238E27FC236}">
+                  <a16:creationId xmlns:a16="http://schemas.microsoft.com/office/drawing/2014/main" id="{165D3D54-8BD4-4645-9A1F-4614D54B9619}"/>
+                </a:ext>
+              </a:extLst>
+            </p:cNvPr>
+            <p:cNvSpPr/>
+            <p:nvPr/>
+          </p:nvSpPr>
+          <p:spPr>
+            <a:xfrm flipH="1">
+              <a:off x="2648032" y="2939107"/>
+              <a:ext cx="247650" cy="793750"/>
+            </a:xfrm>
+            <a:custGeom>
+              <a:avLst/>
+              <a:gdLst>
+                <a:gd name="connsiteX0" fmla="*/ 0 w 349250"/>
+                <a:gd name="connsiteY0" fmla="*/ 0 h 793750"/>
+                <a:gd name="connsiteX1" fmla="*/ 349250 w 349250"/>
+                <a:gd name="connsiteY1" fmla="*/ 0 h 793750"/>
+                <a:gd name="connsiteX2" fmla="*/ 349250 w 349250"/>
+                <a:gd name="connsiteY2" fmla="*/ 73025 h 793750"/>
+                <a:gd name="connsiteX3" fmla="*/ 80230 w 349250"/>
+                <a:gd name="connsiteY3" fmla="*/ 73025 h 793750"/>
+                <a:gd name="connsiteX4" fmla="*/ 80230 w 349250"/>
+                <a:gd name="connsiteY4" fmla="*/ 720725 h 793750"/>
+                <a:gd name="connsiteX5" fmla="*/ 349250 w 349250"/>
+                <a:gd name="connsiteY5" fmla="*/ 720725 h 793750"/>
+                <a:gd name="connsiteX6" fmla="*/ 349250 w 349250"/>
+                <a:gd name="connsiteY6" fmla="*/ 793750 h 793750"/>
+                <a:gd name="connsiteX7" fmla="*/ 0 w 349250"/>
+                <a:gd name="connsiteY7" fmla="*/ 793750 h 793750"/>
+              </a:gdLst>
+              <a:ahLst/>
+              <a:cxnLst>
+                <a:cxn ang="0">
+                  <a:pos x="connsiteX0" y="connsiteY0"/>
+                </a:cxn>
+                <a:cxn ang="0">
+                  <a:pos x="connsiteX1" y="connsiteY1"/>
+                </a:cxn>
+                <a:cxn ang="0">
+                  <a:pos x="connsiteX2" y="connsiteY2"/>
+                </a:cxn>
+                <a:cxn ang="0">
+                  <a:pos x="connsiteX3" y="connsiteY3"/>
+                </a:cxn>
+                <a:cxn ang="0">
+                  <a:pos x="connsiteX4" y="connsiteY4"/>
+                </a:cxn>
+                <a:cxn ang="0">
+                  <a:pos x="connsiteX5" y="connsiteY5"/>
+                </a:cxn>
+                <a:cxn ang="0">
+                  <a:pos x="connsiteX6" y="connsiteY6"/>
+                </a:cxn>
+                <a:cxn ang="0">
+                  <a:pos x="connsiteX7" y="connsiteY7"/>
+                </a:cxn>
+              </a:cxnLst>
+              <a:rect l="l" t="t" r="r" b="b"/>
+              <a:pathLst>
+                <a:path w="349250" h="793750">
+                  <a:moveTo>
+                    <a:pt x="0" y="0"/>
+                  </a:moveTo>
+                  <a:lnTo>
+                    <a:pt x="349250" y="0"/>
+                  </a:lnTo>
+                  <a:lnTo>
+                    <a:pt x="349250" y="73025"/>
+                  </a:lnTo>
+                  <a:lnTo>
+                    <a:pt x="80230" y="73025"/>
+                  </a:lnTo>
+                  <a:lnTo>
+                    <a:pt x="80230" y="720725"/>
+                  </a:lnTo>
+                  <a:lnTo>
+                    <a:pt x="349250" y="720725"/>
+                  </a:lnTo>
+                  <a:lnTo>
+                    <a:pt x="349250" y="793750"/>
+                  </a:lnTo>
+                  <a:lnTo>
+                    <a:pt x="0" y="793750"/>
+                  </a:lnTo>
+                  <a:close/>
+                </a:path>
+              </a:pathLst>
+            </a:custGeom>
+            <a:solidFill>
+              <a:srgbClr val="03DAC6"/>
+            </a:solidFill>
+            <a:ln>
+              <a:noFill/>
+            </a:ln>
+          </p:spPr>
+          <p:style>
+            <a:lnRef idx="2">
+              <a:schemeClr val="accent1">
+                <a:shade val="50000"/>
+              </a:schemeClr>
+            </a:lnRef>
+            <a:fillRef idx="1">
+              <a:schemeClr val="accent1"/>
+            </a:fillRef>
+            <a:effectRef idx="0">
+              <a:schemeClr val="accent1"/>
+            </a:effectRef>
+            <a:fontRef idx="minor">
+              <a:schemeClr val="lt1"/>
+            </a:fontRef>
+          </p:style>
+          <p:txBody>
+            <a:bodyPr wrap="square" rtlCol="0" anchor="ctr">
+              <a:noAutofit/>
+            </a:bodyPr>
+            <a:lstStyle/>
+            <a:p>
+              <a:pPr algn="ctr"/>
+              <a:endParaRPr lang="en-US"/>
+            </a:p>
+          </p:txBody>
+        </p:sp>
+        <p:sp>
+          <p:nvSpPr>
+            <p:cNvPr id="53" name="Forma Livre: Forma 52">
+              <a:extLst>
+                <a:ext uri="{FF2B5EF4-FFF2-40B4-BE49-F238E27FC236}">
+                  <a16:creationId xmlns:a16="http://schemas.microsoft.com/office/drawing/2014/main" id="{EC2A53FC-77D8-4310-9653-9AC6A1393CFB}"/>
+                </a:ext>
+              </a:extLst>
+            </p:cNvPr>
+            <p:cNvSpPr/>
+            <p:nvPr/>
+          </p:nvSpPr>
+          <p:spPr>
+            <a:xfrm flipH="1">
+              <a:off x="5741824" y="2939107"/>
+              <a:ext cx="247650" cy="793750"/>
+            </a:xfrm>
+            <a:custGeom>
+              <a:avLst/>
+              <a:gdLst>
+                <a:gd name="connsiteX0" fmla="*/ 0 w 349250"/>
+                <a:gd name="connsiteY0" fmla="*/ 0 h 793750"/>
+                <a:gd name="connsiteX1" fmla="*/ 349250 w 349250"/>
+                <a:gd name="connsiteY1" fmla="*/ 0 h 793750"/>
+                <a:gd name="connsiteX2" fmla="*/ 349250 w 349250"/>
+                <a:gd name="connsiteY2" fmla="*/ 73025 h 793750"/>
+                <a:gd name="connsiteX3" fmla="*/ 80230 w 349250"/>
+                <a:gd name="connsiteY3" fmla="*/ 73025 h 793750"/>
+                <a:gd name="connsiteX4" fmla="*/ 80230 w 349250"/>
+                <a:gd name="connsiteY4" fmla="*/ 720725 h 793750"/>
+                <a:gd name="connsiteX5" fmla="*/ 349250 w 349250"/>
+                <a:gd name="connsiteY5" fmla="*/ 720725 h 793750"/>
+                <a:gd name="connsiteX6" fmla="*/ 349250 w 349250"/>
+                <a:gd name="connsiteY6" fmla="*/ 793750 h 793750"/>
+                <a:gd name="connsiteX7" fmla="*/ 0 w 349250"/>
+                <a:gd name="connsiteY7" fmla="*/ 793750 h 793750"/>
+              </a:gdLst>
+              <a:ahLst/>
+              <a:cxnLst>
+                <a:cxn ang="0">
+                  <a:pos x="connsiteX0" y="connsiteY0"/>
+                </a:cxn>
+                <a:cxn ang="0">
+                  <a:pos x="connsiteX1" y="connsiteY1"/>
+                </a:cxn>
+                <a:cxn ang="0">
+                  <a:pos x="connsiteX2" y="connsiteY2"/>
+                </a:cxn>
+                <a:cxn ang="0">
+                  <a:pos x="connsiteX3" y="connsiteY3"/>
+                </a:cxn>
+                <a:cxn ang="0">
+                  <a:pos x="connsiteX4" y="connsiteY4"/>
+                </a:cxn>
+                <a:cxn ang="0">
+                  <a:pos x="connsiteX5" y="connsiteY5"/>
+                </a:cxn>
+                <a:cxn ang="0">
+                  <a:pos x="connsiteX6" y="connsiteY6"/>
+                </a:cxn>
+                <a:cxn ang="0">
+                  <a:pos x="connsiteX7" y="connsiteY7"/>
+                </a:cxn>
+              </a:cxnLst>
+              <a:rect l="l" t="t" r="r" b="b"/>
+              <a:pathLst>
+                <a:path w="349250" h="793750">
+                  <a:moveTo>
+                    <a:pt x="0" y="0"/>
+                  </a:moveTo>
+                  <a:lnTo>
+                    <a:pt x="349250" y="0"/>
+                  </a:lnTo>
+                  <a:lnTo>
+                    <a:pt x="349250" y="73025"/>
+                  </a:lnTo>
+                  <a:lnTo>
+                    <a:pt x="80230" y="73025"/>
+                  </a:lnTo>
+                  <a:lnTo>
+                    <a:pt x="80230" y="720725"/>
+                  </a:lnTo>
+                  <a:lnTo>
+                    <a:pt x="349250" y="720725"/>
+                  </a:lnTo>
+                  <a:lnTo>
+                    <a:pt x="349250" y="793750"/>
+                  </a:lnTo>
+                  <a:lnTo>
+                    <a:pt x="0" y="793750"/>
+                  </a:lnTo>
+                  <a:close/>
+                </a:path>
+              </a:pathLst>
+            </a:custGeom>
+            <a:solidFill>
+              <a:srgbClr val="03DAC6"/>
+            </a:solidFill>
+            <a:ln>
+              <a:noFill/>
+            </a:ln>
+          </p:spPr>
+          <p:style>
+            <a:lnRef idx="2">
+              <a:schemeClr val="accent1">
+                <a:shade val="50000"/>
+              </a:schemeClr>
+            </a:lnRef>
+            <a:fillRef idx="1">
+              <a:schemeClr val="accent1"/>
+            </a:fillRef>
+            <a:effectRef idx="0">
+              <a:schemeClr val="accent1"/>
+            </a:effectRef>
+            <a:fontRef idx="minor">
+              <a:schemeClr val="lt1"/>
+            </a:fontRef>
+          </p:style>
+          <p:txBody>
+            <a:bodyPr wrap="square" rtlCol="0" anchor="ctr">
+              <a:noAutofit/>
+            </a:bodyPr>
+            <a:lstStyle/>
+            <a:p>
+              <a:pPr algn="ctr"/>
+              <a:endParaRPr lang="en-US"/>
+            </a:p>
+          </p:txBody>
+        </p:sp>
+      </p:grpSp>
+    </p:spTree>
+    <p:extLst>
+      <p:ext uri="{BB962C8B-B14F-4D97-AF65-F5344CB8AC3E}">
+        <p14:creationId xmlns:p14="http://schemas.microsoft.com/office/powerpoint/2010/main" val="186502568"/>
       </p:ext>
     </p:extLst>
   </p:cSld>

</xml_diff>